<commit_message>
Ejercicios y clase 3
</commit_message>
<xml_diff>
--- a/class_1/clase 1 javascript.pptx
+++ b/class_1/clase 1 javascript.pptx
@@ -12,6 +12,7 @@
     <p:sldId id="258" r:id="rId6"/>
     <p:sldId id="259" r:id="rId7"/>
     <p:sldId id="260" r:id="rId8"/>
+    <p:sldId id="263" r:id="rId9"/>
   </p:sldIdLst>
   <p:sldSz cx="12192000" cy="6858000"/>
   <p:notesSz cx="6858000" cy="9144000"/>
@@ -110,6 +111,11 @@
       </a:defRPr>
     </a:lvl9pPr>
   </p:defaultTextStyle>
+  <p:extLst>
+    <p:ext uri="{EFAFB233-063F-42B5-8137-9DF3F51BA10A}">
+      <p15:sldGuideLst xmlns:p15="http://schemas.microsoft.com/office/powerpoint/2012/main"/>
+    </p:ext>
+  </p:extLst>
 </p:presentation>
 </file>
 
@@ -252,7 +258,7 @@
           <a:p>
             <a:fld id="{48A87A34-81AB-432B-8DAE-1953F412C126}" type="datetimeFigureOut">
               <a:rPr lang="en-US" dirty="0"/>
-              <a:t>2/25/18</a:t>
+              <a:t>3/11/18</a:t>
             </a:fld>
             <a:endParaRPr lang="en-US" dirty="0"/>
           </a:p>
@@ -458,7 +464,7 @@
           <a:p>
             <a:fld id="{48A87A34-81AB-432B-8DAE-1953F412C126}" type="datetimeFigureOut">
               <a:rPr lang="en-US" dirty="0"/>
-              <a:t>2/25/18</a:t>
+              <a:t>3/11/18</a:t>
             </a:fld>
             <a:endParaRPr lang="en-US" dirty="0"/>
           </a:p>
@@ -668,7 +674,7 @@
           <a:p>
             <a:fld id="{48A87A34-81AB-432B-8DAE-1953F412C126}" type="datetimeFigureOut">
               <a:rPr lang="en-US" dirty="0"/>
-              <a:t>2/25/18</a:t>
+              <a:t>3/11/18</a:t>
             </a:fld>
             <a:endParaRPr lang="en-US" dirty="0"/>
           </a:p>
@@ -864,7 +870,7 @@
           <a:p>
             <a:fld id="{48A87A34-81AB-432B-8DAE-1953F412C126}" type="datetimeFigureOut">
               <a:rPr lang="en-US" dirty="0"/>
-              <a:t>2/25/18</a:t>
+              <a:t>3/11/18</a:t>
             </a:fld>
             <a:endParaRPr lang="en-US" dirty="0"/>
           </a:p>
@@ -1138,7 +1144,7 @@
           <a:p>
             <a:fld id="{48A87A34-81AB-432B-8DAE-1953F412C126}" type="datetimeFigureOut">
               <a:rPr lang="en-US" dirty="0"/>
-              <a:t>2/25/18</a:t>
+              <a:t>3/11/18</a:t>
             </a:fld>
             <a:endParaRPr lang="en-US" dirty="0"/>
           </a:p>
@@ -1401,7 +1407,7 @@
           <a:p>
             <a:fld id="{48A87A34-81AB-432B-8DAE-1953F412C126}" type="datetimeFigureOut">
               <a:rPr lang="en-US" dirty="0"/>
-              <a:t>2/25/18</a:t>
+              <a:t>3/11/18</a:t>
             </a:fld>
             <a:endParaRPr lang="en-US" dirty="0"/>
           </a:p>
@@ -1812,7 +1818,7 @@
           <a:p>
             <a:fld id="{48A87A34-81AB-432B-8DAE-1953F412C126}" type="datetimeFigureOut">
               <a:rPr lang="en-US" dirty="0"/>
-              <a:t>2/25/18</a:t>
+              <a:t>3/11/18</a:t>
             </a:fld>
             <a:endParaRPr lang="en-US" dirty="0"/>
           </a:p>
@@ -1956,7 +1962,7 @@
           <a:p>
             <a:fld id="{48A87A34-81AB-432B-8DAE-1953F412C126}" type="datetimeFigureOut">
               <a:rPr lang="en-US" dirty="0"/>
-              <a:t>2/25/18</a:t>
+              <a:t>3/11/18</a:t>
             </a:fld>
             <a:endParaRPr lang="en-US" dirty="0"/>
           </a:p>
@@ -2077,7 +2083,7 @@
           <a:p>
             <a:fld id="{48A87A34-81AB-432B-8DAE-1953F412C126}" type="datetimeFigureOut">
               <a:rPr lang="en-US" dirty="0"/>
-              <a:t>2/25/18</a:t>
+              <a:t>3/11/18</a:t>
             </a:fld>
             <a:endParaRPr lang="en-US" dirty="0"/>
           </a:p>
@@ -2323,7 +2329,7 @@
           <a:p>
             <a:fld id="{48A87A34-81AB-432B-8DAE-1953F412C126}" type="datetimeFigureOut">
               <a:rPr lang="en-US" dirty="0"/>
-              <a:t>2/25/18</a:t>
+              <a:t>3/11/18</a:t>
             </a:fld>
             <a:endParaRPr lang="en-US" dirty="0"/>
           </a:p>
@@ -2764,7 +2770,7 @@
             <a:fld id="{48A87A34-81AB-432B-8DAE-1953F412C126}" type="datetimeFigureOut">
               <a:rPr lang="en-US" dirty="0"/>
               <a:pPr/>
-              <a:t>2/25/18</a:t>
+              <a:t>3/11/18</a:t>
             </a:fld>
             <a:endParaRPr lang="en-US" dirty="0"/>
           </a:p>
@@ -3086,7 +3092,7 @@
             <a:fld id="{48A87A34-81AB-432B-8DAE-1953F412C126}" type="datetimeFigureOut">
               <a:rPr lang="en-US" dirty="0"/>
               <a:pPr/>
-              <a:t>2/25/18</a:t>
+              <a:t>3/11/18</a:t>
             </a:fld>
             <a:endParaRPr lang="en-US" dirty="0"/>
           </a:p>
@@ -4386,15 +4392,7 @@
             </a:pPr>
             <a:r>
               <a:rPr lang="es-ES_tradnl" dirty="0"/>
-              <a:t>Definimos variables de sólo lectura (no confundir con inmutables), esto quiere decir que, cuando asignamos una variable, el nombre de esta va estar asignada a un puntero en memoria, el cual no puede ser </a:t>
-            </a:r>
-            <a:r>
-              <a:rPr lang="es-ES_tradnl" dirty="0" err="1"/>
-              <a:t>sobreescrito</a:t>
-            </a:r>
-            <a:r>
-              <a:rPr lang="es-ES_tradnl" dirty="0"/>
-              <a:t> o reasignado.</a:t>
+              <a:t>Definimos variables de sólo lectura (no confundir con inmutables), esto quiere decir que, cuando asignamos una variable, el nombre de esta va estar asignada a un puntero en memoria, el cual no puede ser sobre escrito o reasignado.</a:t>
             </a:r>
           </a:p>
         </p:txBody>
@@ -4515,8 +4513,8 @@
           </a:p>
           <a:p>
             <a:r>
-              <a:rPr lang="es-ES_tradnl" dirty="0" err="1"/>
-              <a:t>contains</a:t>
+              <a:rPr lang="es-ES_tradnl"/>
+              <a:t>includes</a:t>
             </a:r>
             <a:endParaRPr lang="es-ES_tradnl" dirty="0"/>
           </a:p>
@@ -4540,6 +4538,96 @@
     <p:extLst>
       <p:ext uri="{BB962C8B-B14F-4D97-AF65-F5344CB8AC3E}">
         <p14:creationId xmlns:p14="http://schemas.microsoft.com/office/powerpoint/2010/main" val="1230138025"/>
+      </p:ext>
+    </p:extLst>
+  </p:cSld>
+  <p:clrMapOvr>
+    <a:masterClrMapping/>
+  </p:clrMapOvr>
+</p:sld>
+</file>
+
+<file path=ppt/slides/slide8.xml><?xml version="1.0" encoding="utf-8"?>
+<p:sld xmlns:a="http://schemas.openxmlformats.org/drawingml/2006/main" xmlns:r="http://schemas.openxmlformats.org/officeDocument/2006/relationships" xmlns:p="http://schemas.openxmlformats.org/presentationml/2006/main">
+  <p:cSld>
+    <p:spTree>
+      <p:nvGrpSpPr>
+        <p:cNvPr id="1" name=""/>
+        <p:cNvGrpSpPr/>
+        <p:nvPr/>
+      </p:nvGrpSpPr>
+      <p:grpSpPr>
+        <a:xfrm>
+          <a:off x="0" y="0"/>
+          <a:ext cx="0" cy="0"/>
+          <a:chOff x="0" y="0"/>
+          <a:chExt cx="0" cy="0"/>
+        </a:xfrm>
+      </p:grpSpPr>
+      <p:sp>
+        <p:nvSpPr>
+          <p:cNvPr id="2" name="Title 1">
+            <a:extLst>
+              <a:ext uri="{FF2B5EF4-FFF2-40B4-BE49-F238E27FC236}">
+                <a16:creationId xmlns:a16="http://schemas.microsoft.com/office/drawing/2014/main" id="{918232B5-5F03-BB44-A310-09D5AFB45969}"/>
+              </a:ext>
+            </a:extLst>
+          </p:cNvPr>
+          <p:cNvSpPr>
+            <a:spLocks noGrp="1"/>
+          </p:cNvSpPr>
+          <p:nvPr>
+            <p:ph type="title"/>
+          </p:nvPr>
+        </p:nvSpPr>
+        <p:spPr/>
+        <p:txBody>
+          <a:bodyPr/>
+          <a:lstStyle/>
+          <a:p>
+            <a:r>
+              <a:rPr lang="es-ES_tradnl" dirty="0"/>
+              <a:t>Ejercicio</a:t>
+            </a:r>
+          </a:p>
+        </p:txBody>
+      </p:sp>
+      <p:sp>
+        <p:nvSpPr>
+          <p:cNvPr id="3" name="Content Placeholder 2">
+            <a:extLst>
+              <a:ext uri="{FF2B5EF4-FFF2-40B4-BE49-F238E27FC236}">
+                <a16:creationId xmlns:a16="http://schemas.microsoft.com/office/drawing/2014/main" id="{1A478D51-5759-5049-A91F-2DD28AB77CB0}"/>
+              </a:ext>
+            </a:extLst>
+          </p:cNvPr>
+          <p:cNvSpPr>
+            <a:spLocks noGrp="1"/>
+          </p:cNvSpPr>
+          <p:nvPr>
+            <p:ph idx="1"/>
+          </p:nvPr>
+        </p:nvSpPr>
+        <p:spPr/>
+        <p:txBody>
+          <a:bodyPr/>
+          <a:lstStyle/>
+          <a:p>
+            <a:r>
+              <a:rPr lang="es-ES_tradnl" dirty="0"/>
+              <a:t>Hacer un programa que reciba un valor y le calcule </a:t>
+            </a:r>
+            <a:r>
+              <a:rPr lang="es-ES_tradnl"/>
+              <a:t>el IVA del 19%.</a:t>
+            </a:r>
+          </a:p>
+        </p:txBody>
+      </p:sp>
+    </p:spTree>
+    <p:extLst>
+      <p:ext uri="{BB962C8B-B14F-4D97-AF65-F5344CB8AC3E}">
+        <p14:creationId xmlns:p14="http://schemas.microsoft.com/office/powerpoint/2010/main" val="2101465837"/>
       </p:ext>
     </p:extLst>
   </p:cSld>

</xml_diff>